<commit_message>
tweaks to PowerPoint presentation
</commit_message>
<xml_diff>
--- a/LMS method for growth charts.pptx
+++ b/LMS method for growth charts.pptx
@@ -114,6 +114,11 @@
       </a:defRPr>
     </a:lvl9pPr>
   </p:defaultTextStyle>
+  <p:extLst>
+    <p:ext uri="{EFAFB233-063F-42B5-8137-9DF3F51BA10A}">
+      <p15:sldGuideLst xmlns:p15="http://schemas.microsoft.com/office/powerpoint/2012/main"/>
+    </p:ext>
+  </p:extLst>
 </p:presentation>
 </file>
 
@@ -198,7 +203,7 @@
           </a:lstStyle>
           <a:p>
             <a:fld id="{AB7CD465-F4B6-4747-B8AC-E0871C454C59}" type="datetimeFigureOut">
-              <a:t>29/02/2020</a:t>
+              <a:t>3/10/20</a:t>
             </a:fld>
             <a:endParaRPr lang="en-GB"/>
           </a:p>
@@ -1037,7 +1042,7 @@
           <a:lstStyle/>
           <a:p>
             <a:fld id="{D6D7456A-C8A8-6B4C-98A2-D7CAF4134859}" type="datetimeFigureOut">
-              <a:t>29/02/2020</a:t>
+              <a:t>3/10/20</a:t>
             </a:fld>
             <a:endParaRPr lang="en-GB"/>
           </a:p>
@@ -1233,7 +1238,7 @@
           <a:lstStyle/>
           <a:p>
             <a:fld id="{D6D7456A-C8A8-6B4C-98A2-D7CAF4134859}" type="datetimeFigureOut">
-              <a:t>29/02/2020</a:t>
+              <a:t>3/10/20</a:t>
             </a:fld>
             <a:endParaRPr lang="en-GB"/>
           </a:p>
@@ -1439,7 +1444,7 @@
           <a:lstStyle/>
           <a:p>
             <a:fld id="{D6D7456A-C8A8-6B4C-98A2-D7CAF4134859}" type="datetimeFigureOut">
-              <a:t>29/02/2020</a:t>
+              <a:t>3/10/20</a:t>
             </a:fld>
             <a:endParaRPr lang="en-GB"/>
           </a:p>
@@ -1961,7 +1966,7 @@
           <a:lstStyle/>
           <a:p>
             <a:fld id="{D6D7456A-C8A8-6B4C-98A2-D7CAF4134859}" type="datetimeFigureOut">
-              <a:t>29/02/2020</a:t>
+              <a:t>3/10/20</a:t>
             </a:fld>
             <a:endParaRPr lang="en-GB"/>
           </a:p>
@@ -2234,7 +2239,7 @@
           <a:lstStyle/>
           <a:p>
             <a:fld id="{D6D7456A-C8A8-6B4C-98A2-D7CAF4134859}" type="datetimeFigureOut">
-              <a:t>29/02/2020</a:t>
+              <a:t>3/10/20</a:t>
             </a:fld>
             <a:endParaRPr lang="en-GB"/>
           </a:p>
@@ -2497,7 +2502,7 @@
           <a:lstStyle/>
           <a:p>
             <a:fld id="{D6D7456A-C8A8-6B4C-98A2-D7CAF4134859}" type="datetimeFigureOut">
-              <a:t>29/02/2020</a:t>
+              <a:t>3/10/20</a:t>
             </a:fld>
             <a:endParaRPr lang="en-GB"/>
           </a:p>
@@ -2907,7 +2912,7 @@
           <a:lstStyle/>
           <a:p>
             <a:fld id="{D6D7456A-C8A8-6B4C-98A2-D7CAF4134859}" type="datetimeFigureOut">
-              <a:t>29/02/2020</a:t>
+              <a:t>3/10/20</a:t>
             </a:fld>
             <a:endParaRPr lang="en-GB"/>
           </a:p>
@@ -3046,7 +3051,7 @@
           <a:lstStyle/>
           <a:p>
             <a:fld id="{D6D7456A-C8A8-6B4C-98A2-D7CAF4134859}" type="datetimeFigureOut">
-              <a:t>29/02/2020</a:t>
+              <a:t>3/10/20</a:t>
             </a:fld>
             <a:endParaRPr lang="en-GB"/>
           </a:p>
@@ -3157,7 +3162,7 @@
           <a:lstStyle/>
           <a:p>
             <a:fld id="{D6D7456A-C8A8-6B4C-98A2-D7CAF4134859}" type="datetimeFigureOut">
-              <a:t>29/02/2020</a:t>
+              <a:t>3/10/20</a:t>
             </a:fld>
             <a:endParaRPr lang="en-GB"/>
           </a:p>
@@ -3466,7 +3471,7 @@
           <a:lstStyle/>
           <a:p>
             <a:fld id="{D6D7456A-C8A8-6B4C-98A2-D7CAF4134859}" type="datetimeFigureOut">
-              <a:t>29/02/2020</a:t>
+              <a:t>3/10/20</a:t>
             </a:fld>
             <a:endParaRPr lang="en-GB"/>
           </a:p>
@@ -3752,7 +3757,7 @@
           <a:lstStyle/>
           <a:p>
             <a:fld id="{D6D7456A-C8A8-6B4C-98A2-D7CAF4134859}" type="datetimeFigureOut">
-              <a:t>29/02/2020</a:t>
+              <a:t>3/10/20</a:t>
             </a:fld>
             <a:endParaRPr lang="en-GB"/>
           </a:p>
@@ -3991,7 +3996,7 @@
           </a:lstStyle>
           <a:p>
             <a:fld id="{D6D7456A-C8A8-6B4C-98A2-D7CAF4134859}" type="datetimeFigureOut">
-              <a:t>29/02/2020</a:t>
+              <a:t>3/10/20</a:t>
             </a:fld>
             <a:endParaRPr lang="en-GB"/>
           </a:p>
@@ -4425,12 +4430,20 @@
             <p:ph type="ctrTitle"/>
           </p:nvPr>
         </p:nvSpPr>
-        <p:spPr/>
+        <p:spPr>
+          <a:xfrm>
+            <a:off x="819807" y="1122363"/>
+            <a:ext cx="10552386" cy="2387600"/>
+          </a:xfrm>
+        </p:spPr>
         <p:txBody>
           <a:bodyPr/>
           <a:lstStyle/>
           <a:p>
-            <a:endParaRPr lang="en-GB"/>
+            <a:r>
+              <a:rPr lang="en-GB" dirty="0"/>
+              <a:t>LMS method for growth charts</a:t>
+            </a:r>
           </a:p>
         </p:txBody>
       </p:sp>
@@ -4455,7 +4468,13 @@
           <a:bodyPr/>
           <a:lstStyle/>
           <a:p>
-            <a:endParaRPr lang="en-GB"/>
+            <a:endParaRPr lang="en-GB" dirty="0"/>
+          </a:p>
+          <a:p>
+            <a:r>
+              <a:rPr lang="en-GB" dirty="0"/>
+              <a:t>Tim Cole</a:t>
+            </a:r>
           </a:p>
         </p:txBody>
       </p:sp>
@@ -4502,7 +4521,7 @@
         <p:spPr/>
         <p:txBody>
           <a:bodyPr>
-            <a:normAutofit lnSpcReduction="10000"/>
+            <a:normAutofit/>
           </a:bodyPr>
           <a:lstStyle/>
           <a:p>
@@ -4655,13 +4674,13 @@
           </a:ln>
           <a:extLst>
             <a:ext uri="{C572A759-6A51-4108-AA02-DFA0A04FC94B}">
-              <ma14:wrappingTextBoxFlag xmlns:ma14="http://schemas.microsoft.com/office/mac/drawingml/2011/main" xmlns="" val="1"/>
+              <ma14:wrappingTextBoxFlag xmlns="" xmlns:ma14="http://schemas.microsoft.com/office/mac/drawingml/2011/main" val="1"/>
             </a:ext>
           </a:extLst>
         </p:spPr>
         <p:txBody>
           <a:bodyPr lIns="35719" tIns="35719" rIns="35719" bIns="35719" anchor="ctr">
-            <a:normAutofit fontScale="90000"/>
+            <a:normAutofit fontScale="97500"/>
           </a:bodyPr>
           <a:lstStyle>
             <a:lvl1pPr marL="0" marR="0" indent="0" algn="ctr" defTabSz="584200" rtl="0" latinLnBrk="0">
@@ -4927,8 +4946,11 @@
             </a:lvl9pPr>
           </a:lstStyle>
           <a:p>
-            <a:r>
-              <a:rPr lang="en-US" sz="5625" dirty="0"/>
+            <a:pPr algn="l"/>
+            <a:r>
+              <a:rPr lang="en-US" sz="4400" dirty="0">
+                <a:latin typeface="+mj-lt"/>
+              </a:rPr>
               <a:t>Constructing growth charts</a:t>
             </a:r>
           </a:p>
@@ -4961,13 +4983,7 @@
           <a:solidFill>
             <a:srgbClr val="FFFFFF"/>
           </a:solidFill>
-          <a:effectLst>
-            <a:outerShdw blurRad="50800" dist="38100" dir="2700000" algn="tl" rotWithShape="0">
-              <a:srgbClr val="000000">
-                <a:alpha val="43000"/>
-              </a:srgbClr>
-            </a:outerShdw>
-          </a:effectLst>
+          <a:effectLst/>
         </p:spPr>
       </p:pic>
     </p:spTree>
@@ -5014,7 +5030,7 @@
         <p:spPr/>
         <p:txBody>
           <a:bodyPr>
-            <a:normAutofit lnSpcReduction="10000"/>
+            <a:normAutofit/>
           </a:bodyPr>
           <a:lstStyle/>
           <a:p>
@@ -5142,13 +5158,13 @@
           </a:ln>
           <a:extLst>
             <a:ext uri="{C572A759-6A51-4108-AA02-DFA0A04FC94B}">
-              <ma14:wrappingTextBoxFlag xmlns:ma14="http://schemas.microsoft.com/office/mac/drawingml/2011/main" xmlns="" val="1"/>
+              <ma14:wrappingTextBoxFlag xmlns="" xmlns:ma14="http://schemas.microsoft.com/office/mac/drawingml/2011/main" val="1"/>
             </a:ext>
           </a:extLst>
         </p:spPr>
         <p:txBody>
           <a:bodyPr lIns="35719" tIns="35719" rIns="35719" bIns="35719" anchor="ctr">
-            <a:normAutofit fontScale="90000"/>
+            <a:normAutofit fontScale="97500"/>
           </a:bodyPr>
           <a:lstStyle>
             <a:lvl1pPr marL="0" marR="0" indent="0" algn="ctr" defTabSz="584200" rtl="0" latinLnBrk="0">
@@ -5414,8 +5430,11 @@
             </a:lvl9pPr>
           </a:lstStyle>
           <a:p>
-            <a:r>
-              <a:rPr lang="en-US" sz="5625" dirty="0"/>
+            <a:pPr algn="l"/>
+            <a:r>
+              <a:rPr lang="en-US" sz="4400" dirty="0">
+                <a:latin typeface="+mj-lt"/>
+              </a:rPr>
               <a:t>Constructing growth charts</a:t>
             </a:r>
           </a:p>
@@ -5448,13 +5467,7 @@
           <a:solidFill>
             <a:srgbClr val="FFFFFF"/>
           </a:solidFill>
-          <a:effectLst>
-            <a:outerShdw blurRad="50800" dist="38100" dir="2700000" algn="tl" rotWithShape="0">
-              <a:srgbClr val="000000">
-                <a:alpha val="43000"/>
-              </a:srgbClr>
-            </a:outerShdw>
-          </a:effectLst>
+          <a:effectLst/>
         </p:spPr>
       </p:pic>
     </p:spTree>
@@ -5498,7 +5511,12 @@
             <p:ph type="body" sz="half" idx="1"/>
           </p:nvPr>
         </p:nvSpPr>
-        <p:spPr/>
+        <p:spPr>
+          <a:xfrm>
+            <a:off x="892970" y="1830586"/>
+            <a:ext cx="4856190" cy="4420195"/>
+          </a:xfrm>
+        </p:spPr>
         <p:txBody>
           <a:bodyPr>
             <a:normAutofit/>
@@ -5506,30 +5524,33 @@
           <a:lstStyle/>
           <a:p>
             <a:r>
-              <a:rPr lang="en-US"/>
+              <a:rPr lang="en-US" dirty="0"/>
               <a:t>Cole, JRSS A (1988)</a:t>
             </a:r>
           </a:p>
           <a:p>
             <a:r>
-              <a:rPr lang="en-US"/>
+              <a:rPr lang="en-US" dirty="0"/>
               <a:t>Split into narrow age groups</a:t>
             </a:r>
           </a:p>
           <a:p>
             <a:r>
-              <a:rPr lang="en-US"/>
-              <a:t>Summarise skew weight distribution in each group</a:t>
-            </a:r>
-          </a:p>
-          <a:p>
-            <a:pPr lvl="1"/>
-            <a:r>
-              <a:rPr lang="en-GB"/>
-              <a:t>Power </a:t>
-            </a:r>
-            <a:r>
-              <a:rPr lang="el-GR">
+              <a:rPr lang="en-US" dirty="0" err="1"/>
+              <a:t>Summarise</a:t>
+            </a:r>
+            <a:r>
+              <a:rPr lang="en-US" dirty="0"/>
+              <a:t> skew weight distribution in each group</a:t>
+            </a:r>
+          </a:p>
+          <a:p>
+            <a:r>
+              <a:rPr lang="en-GB" dirty="0"/>
+              <a:t>Power transformation </a:t>
+            </a:r>
+            <a:r>
+              <a:rPr lang="el-GR" dirty="0">
                 <a:solidFill>
                   <a:srgbClr val="008000"/>
                 </a:solidFill>
@@ -5537,11 +5558,11 @@
               <a:t>λ</a:t>
             </a:r>
             <a:r>
-              <a:rPr lang="en-GB"/>
+              <a:rPr lang="en-GB" dirty="0"/>
               <a:t>, mean </a:t>
             </a:r>
             <a:r>
-              <a:rPr lang="el-GR">
+              <a:rPr lang="el-GR" dirty="0">
                 <a:solidFill>
                   <a:srgbClr val="FF0000"/>
                 </a:solidFill>
@@ -5549,23 +5570,23 @@
               <a:t>μ</a:t>
             </a:r>
             <a:r>
-              <a:rPr lang="en-US"/>
+              <a:rPr lang="en-US" dirty="0"/>
               <a:t> and coefficient of variation </a:t>
             </a:r>
             <a:r>
-              <a:rPr lang="el-GR">
+              <a:rPr lang="el-GR" dirty="0">
                 <a:solidFill>
                   <a:srgbClr val="0000FF"/>
                 </a:solidFill>
               </a:rPr>
               <a:t>σ</a:t>
             </a:r>
-            <a:endParaRPr lang="en-GB"/>
+            <a:endParaRPr lang="en-GB" dirty="0"/>
           </a:p>
           <a:p>
             <a:pPr marL="241093" lvl="1"/>
             <a:r>
-              <a:rPr lang="el-GR">
+              <a:rPr lang="el-GR" dirty="0">
                 <a:solidFill>
                   <a:srgbClr val="008000"/>
                 </a:solidFill>
@@ -5573,7 +5594,7 @@
               <a:t>λ</a:t>
             </a:r>
             <a:r>
-              <a:rPr lang="en-GB">
+              <a:rPr lang="en-GB" dirty="0">
                 <a:solidFill>
                   <a:srgbClr val="008000"/>
                 </a:solidFill>
@@ -5581,7 +5602,7 @@
               <a:t> </a:t>
             </a:r>
             <a:r>
-              <a:rPr lang="el-GR">
+              <a:rPr lang="el-GR" dirty="0">
                 <a:solidFill>
                   <a:srgbClr val="FF0000"/>
                 </a:solidFill>
@@ -5589,11 +5610,11 @@
               <a:t>μ</a:t>
             </a:r>
             <a:r>
-              <a:rPr lang="en-US"/>
+              <a:rPr lang="en-US" dirty="0"/>
               <a:t> and </a:t>
             </a:r>
             <a:r>
-              <a:rPr lang="el-GR">
+              <a:rPr lang="el-GR" dirty="0">
                 <a:solidFill>
                   <a:srgbClr val="0000FF"/>
                 </a:solidFill>
@@ -5601,7 +5622,7 @@
               <a:t>σ</a:t>
             </a:r>
             <a:r>
-              <a:rPr lang="en-GB">
+              <a:rPr lang="en-GB" dirty="0">
                 <a:solidFill>
                   <a:srgbClr val="0000FF"/>
                 </a:solidFill>
@@ -5609,7 +5630,7 @@
               <a:t> </a:t>
             </a:r>
             <a:r>
-              <a:rPr lang="en-GB"/>
+              <a:rPr lang="en-GB" dirty="0"/>
               <a:t>vary by age</a:t>
             </a:r>
           </a:p>
@@ -5647,13 +5668,7 @@
               <a:srgbClr val="FFFFFF"/>
             </a:solidFill>
           </a:ln>
-          <a:effectLst>
-            <a:outerShdw blurRad="50800" dist="38100" dir="2700000" algn="tl" rotWithShape="0">
-              <a:srgbClr val="000000">
-                <a:alpha val="43000"/>
-              </a:srgbClr>
-            </a:outerShdw>
-          </a:effectLst>
+          <a:effectLst/>
         </p:spPr>
       </p:pic>
       <p:sp>
@@ -5679,7 +5694,7 @@
           <a:lstStyle/>
           <a:p>
             <a:r>
-              <a:rPr lang="en-US"/>
+              <a:rPr lang="en-US" dirty="0"/>
               <a:t>LMS method</a:t>
             </a:r>
           </a:p>
@@ -6056,16 +6071,14 @@
           </a:stretch>
         </p:blipFill>
         <p:spPr>
+          <a:xfrm>
+            <a:off x="6298406" y="1830586"/>
+            <a:ext cx="5000625" cy="4420195"/>
+          </a:xfrm>
           <a:solidFill>
             <a:srgbClr val="FFFFFF"/>
           </a:solidFill>
-          <a:effectLst>
-            <a:outerShdw blurRad="50800" dist="38100" dir="2700000" algn="tl" rotWithShape="0">
-              <a:srgbClr val="000000">
-                <a:alpha val="43000"/>
-              </a:srgbClr>
-            </a:outerShdw>
-          </a:effectLst>
+          <a:effectLst/>
         </p:spPr>
       </p:pic>
       <p:sp>
@@ -6091,7 +6104,7 @@
           <a:lstStyle/>
           <a:p>
             <a:r>
-              <a:rPr lang="en-US"/>
+              <a:rPr lang="en-US" dirty="0"/>
               <a:t>LMS method</a:t>
             </a:r>
           </a:p>
@@ -6147,18 +6160,18 @@
           <a:p>
             <a:pPr marL="241093" lvl="1"/>
             <a:r>
-              <a:rPr lang="en-GB"/>
+              <a:rPr lang="en-GB" dirty="0"/>
               <a:t>Centile curves are functions </a:t>
             </a:r>
             <a:br>
-              <a:rPr lang="en-GB"/>
+              <a:rPr lang="en-GB" dirty="0"/>
             </a:br>
             <a:r>
-              <a:rPr lang="en-GB"/>
+              <a:rPr lang="en-GB" dirty="0"/>
               <a:t>of </a:t>
             </a:r>
             <a:r>
-              <a:rPr lang="en-GB">
+              <a:rPr lang="en-GB" dirty="0">
                 <a:solidFill>
                   <a:srgbClr val="008000"/>
                 </a:solidFill>
@@ -6166,7 +6179,7 @@
               <a:t>L </a:t>
             </a:r>
             <a:r>
-              <a:rPr lang="en-GB">
+              <a:rPr lang="en-GB" dirty="0">
                 <a:solidFill>
                   <a:srgbClr val="FF0000"/>
                 </a:solidFill>
@@ -6174,11 +6187,11 @@
               <a:t>M</a:t>
             </a:r>
             <a:r>
-              <a:rPr lang="en-US"/>
+              <a:rPr lang="en-US" dirty="0"/>
               <a:t> and </a:t>
             </a:r>
             <a:r>
-              <a:rPr lang="en-GB">
+              <a:rPr lang="en-GB" dirty="0">
                 <a:solidFill>
                   <a:srgbClr val="0000FF"/>
                 </a:solidFill>
@@ -6186,7 +6199,7 @@
               <a:t>S</a:t>
             </a:r>
             <a:r>
-              <a:rPr lang="en-GB">
+              <a:rPr lang="en-GB" dirty="0">
                 <a:solidFill>
                   <a:schemeClr val="tx1"/>
                 </a:solidFill>
@@ -6195,20 +6208,19 @@
             </a:r>
           </a:p>
           <a:p>
-            <a:pPr marL="482186" lvl="2"/>
-            <a:r>
-              <a:rPr lang="en-GB">
-                <a:solidFill>
-                  <a:schemeClr val="tx1"/>
-                </a:solidFill>
-              </a:rPr>
-              <a:t> </a:t>
-            </a:r>
+            <a:pPr marL="241093" lvl="2" indent="0">
+              <a:buNone/>
+            </a:pPr>
+            <a:endParaRPr lang="en-GB" dirty="0">
+              <a:solidFill>
+                <a:schemeClr val="tx1"/>
+              </a:solidFill>
+            </a:endParaRPr>
           </a:p>
           <a:p>
             <a:pPr marL="241093" lvl="1"/>
             <a:r>
-              <a:rPr lang="en-GB">
+              <a:rPr lang="en-GB" dirty="0">
                 <a:solidFill>
                   <a:schemeClr val="tx1"/>
                 </a:solidFill>
@@ -6216,7 +6228,7 @@
               <a:t>So if </a:t>
             </a:r>
             <a:r>
-              <a:rPr lang="en-GB">
+              <a:rPr lang="en-GB" dirty="0">
                 <a:solidFill>
                   <a:srgbClr val="008000"/>
                 </a:solidFill>
@@ -6224,7 +6236,7 @@
               <a:t>L </a:t>
             </a:r>
             <a:r>
-              <a:rPr lang="en-GB">
+              <a:rPr lang="en-GB" dirty="0">
                 <a:solidFill>
                   <a:srgbClr val="FF0000"/>
                 </a:solidFill>
@@ -6232,11 +6244,11 @@
               <a:t>M</a:t>
             </a:r>
             <a:r>
-              <a:rPr lang="en-US"/>
+              <a:rPr lang="en-US" dirty="0"/>
               <a:t> and </a:t>
             </a:r>
             <a:r>
-              <a:rPr lang="en-GB">
+              <a:rPr lang="en-GB" dirty="0">
                 <a:solidFill>
                   <a:srgbClr val="0000FF"/>
                 </a:solidFill>
@@ -6244,7 +6256,7 @@
               <a:t>S</a:t>
             </a:r>
             <a:r>
-              <a:rPr lang="en-GB">
+              <a:rPr lang="en-GB" dirty="0">
                 <a:solidFill>
                   <a:schemeClr val="tx1"/>
                 </a:solidFill>
@@ -6252,7 +6264,7 @@
               <a:t> curves are smooth, </a:t>
             </a:r>
             <a:r>
-              <a:rPr lang="en-GB"/>
+              <a:rPr lang="en-GB" dirty="0"/>
               <a:t>centiles are too</a:t>
             </a:r>
           </a:p>
@@ -6274,7 +6286,7 @@
           <a:graphicData uri="http://schemas.openxmlformats.org/presentationml/2006/ole">
             <mc:AlternateContent xmlns:mc="http://schemas.openxmlformats.org/markup-compatibility/2006">
               <mc:Choice xmlns:v="urn:schemas-microsoft-com:vml" Requires="v">
-                <p:oleObj spid="_x0000_s1026" name="Equation" r:id="rId4" imgW="1739900" imgH="241300" progId="Equation.DSMT4">
+                <p:oleObj spid="_x0000_s1028" name="Equation" r:id="rId4" imgW="1739900" imgH="241300" progId="Equation.DSMT4">
                   <p:embed/>
                 </p:oleObj>
               </mc:Choice>
@@ -6365,13 +6377,7 @@
           <a:solidFill>
             <a:srgbClr val="FFFFFF"/>
           </a:solidFill>
-          <a:effectLst>
-            <a:outerShdw blurRad="50800" dist="38100" dir="2700000" algn="tl" rotWithShape="0">
-              <a:srgbClr val="000000">
-                <a:alpha val="43000"/>
-              </a:srgbClr>
-            </a:outerShdw>
-          </a:effectLst>
+          <a:effectLst/>
         </p:spPr>
       </p:pic>
     </p:spTree>
@@ -6496,7 +6502,7 @@
         <p:spPr/>
         <p:txBody>
           <a:bodyPr>
-            <a:normAutofit fontScale="90000"/>
+            <a:normAutofit/>
           </a:bodyPr>
           <a:lstStyle/>
           <a:p>
@@ -6525,7 +6531,7 @@
         </p:spPr>
         <p:txBody>
           <a:bodyPr>
-            <a:normAutofit lnSpcReduction="10000"/>
+            <a:normAutofit/>
           </a:bodyPr>
           <a:lstStyle/>
           <a:p>
@@ -6582,19 +6588,13 @@
         </p:blipFill>
         <p:spPr>
           <a:xfrm>
-            <a:off x="2668686" y="3036538"/>
+            <a:off x="2668686" y="2836848"/>
             <a:ext cx="6017257" cy="832174"/>
           </a:xfrm>
           <a:prstGeom prst="rect">
             <a:avLst/>
           </a:prstGeom>
-          <a:effectLst>
-            <a:outerShdw blurRad="50800" dist="38100" dir="2700000" algn="tl" rotWithShape="0">
-              <a:srgbClr val="000000">
-                <a:alpha val="43000"/>
-              </a:srgbClr>
-            </a:outerShdw>
-          </a:effectLst>
+          <a:effectLst/>
         </p:spPr>
       </p:pic>
       <p:pic>
@@ -6625,13 +6625,7 @@
           <a:prstGeom prst="rect">
             <a:avLst/>
           </a:prstGeom>
-          <a:effectLst>
-            <a:outerShdw blurRad="50800" dist="38100" dir="2700000" algn="tl" rotWithShape="0">
-              <a:srgbClr val="000000">
-                <a:alpha val="43000"/>
-              </a:srgbClr>
-            </a:outerShdw>
-          </a:effectLst>
+          <a:effectLst/>
         </p:spPr>
       </p:pic>
       <p:sp>
@@ -6738,13 +6732,7 @@
           </a:stretch>
         </p:blipFill>
         <p:spPr>
-          <a:effectLst>
-            <a:outerShdw blurRad="50800" dist="38100" dir="2700000" algn="tl" rotWithShape="0">
-              <a:srgbClr val="000000">
-                <a:alpha val="43000"/>
-              </a:srgbClr>
-            </a:outerShdw>
-          </a:effectLst>
+          <a:effectLst/>
         </p:spPr>
       </p:pic>
       <p:sp>

</xml_diff>